<commit_message>
two figured merged in modeling.tex
</commit_message>
<xml_diff>
--- a/other/CMTR.pptx
+++ b/other/CMTR.pptx
@@ -114,7 +114,17 @@
   <c:chart>
     <c:autoTitleDeleted val="1"/>
     <c:plotArea>
-      <c:layout/>
+      <c:layout>
+        <c:manualLayout>
+          <c:layoutTarget val="inner"/>
+          <c:xMode val="edge"/>
+          <c:yMode val="edge"/>
+          <c:x val="0.20786435893626504"/>
+          <c:y val="5.1400554097404488E-2"/>
+          <c:w val="0.74957287178725296"/>
+          <c:h val="0.74741169853768274"/>
+        </c:manualLayout>
+      </c:layout>
       <c:scatterChart>
         <c:scatterStyle val="smoothMarker"/>
         <c:ser>
@@ -134,13 +144,13 @@
                 <c:formatCode>General</c:formatCode>
                 <c:ptCount val="79"/>
                 <c:pt idx="0">
-                  <c:v>4.4999999999999998E-2</c:v>
+                  <c:v>4.5000000000000012E-2</c:v>
                 </c:pt>
                 <c:pt idx="1">
-                  <c:v>6.7500000000000004E-2</c:v>
+                  <c:v>6.7500000000000018E-2</c:v>
                 </c:pt>
                 <c:pt idx="2">
-                  <c:v>0.09</c:v>
+                  <c:v>9.0000000000000024E-2</c:v>
                 </c:pt>
                 <c:pt idx="3">
                   <c:v>0.11249999999999999</c:v>
@@ -149,52 +159,52 @@
                   <c:v>0.13500000000000001</c:v>
                 </c:pt>
                 <c:pt idx="5">
-                  <c:v>0.1575</c:v>
+                  <c:v>0.15750000000000003</c:v>
                 </c:pt>
                 <c:pt idx="6">
-                  <c:v>0.18</c:v>
+                  <c:v>0.18000000000000002</c:v>
                 </c:pt>
                 <c:pt idx="7">
-                  <c:v>0.20249999999999999</c:v>
+                  <c:v>0.20250000000000001</c:v>
                 </c:pt>
                 <c:pt idx="8">
-                  <c:v>0.22499999999999998</c:v>
+                  <c:v>0.22500000000000003</c:v>
                 </c:pt>
                 <c:pt idx="9">
-                  <c:v>0.2475</c:v>
+                  <c:v>0.24750000000000003</c:v>
                 </c:pt>
                 <c:pt idx="10">
                   <c:v>0.27</c:v>
                 </c:pt>
                 <c:pt idx="11">
-                  <c:v>0.29249999999999998</c:v>
+                  <c:v>0.29250000000000004</c:v>
                 </c:pt>
                 <c:pt idx="12">
-                  <c:v>0.315</c:v>
+                  <c:v>0.31500000000000006</c:v>
                 </c:pt>
                 <c:pt idx="13">
-                  <c:v>0.33749999999999997</c:v>
+                  <c:v>0.33750000000000008</c:v>
                 </c:pt>
                 <c:pt idx="14">
-                  <c:v>0.36</c:v>
+                  <c:v>0.36000000000000004</c:v>
                 </c:pt>
                 <c:pt idx="15">
-                  <c:v>0.38250000000000001</c:v>
+                  <c:v>0.38250000000000006</c:v>
                 </c:pt>
                 <c:pt idx="16">
-                  <c:v>0.40499999999999997</c:v>
+                  <c:v>0.40500000000000003</c:v>
                 </c:pt>
                 <c:pt idx="17">
-                  <c:v>0.42749999999999999</c:v>
+                  <c:v>0.4275000000000001</c:v>
                 </c:pt>
                 <c:pt idx="18">
-                  <c:v>0.44999999999999996</c:v>
+                  <c:v>0.45000000000000007</c:v>
                 </c:pt>
                 <c:pt idx="19">
-                  <c:v>0.47249999999999998</c:v>
+                  <c:v>0.47250000000000003</c:v>
                 </c:pt>
                 <c:pt idx="20">
-                  <c:v>0.495</c:v>
+                  <c:v>0.49500000000000005</c:v>
                 </c:pt>
                 <c:pt idx="21">
                   <c:v>0.51749999999999996</c:v>
@@ -206,31 +216,31 @@
                   <c:v>0.5625</c:v>
                 </c:pt>
                 <c:pt idx="24">
-                  <c:v>0.58499999999999996</c:v>
+                  <c:v>0.58500000000000008</c:v>
                 </c:pt>
                 <c:pt idx="25">
                   <c:v>0.60749999999999993</c:v>
                 </c:pt>
                 <c:pt idx="26">
-                  <c:v>0.63</c:v>
+                  <c:v>0.63000000000000012</c:v>
                 </c:pt>
                 <c:pt idx="27">
-                  <c:v>0.65249999999999997</c:v>
+                  <c:v>0.65250000000000008</c:v>
                 </c:pt>
                 <c:pt idx="28">
-                  <c:v>0.67499999999999993</c:v>
+                  <c:v>0.67500000000000004</c:v>
                 </c:pt>
                 <c:pt idx="29">
-                  <c:v>0.69750000000000001</c:v>
+                  <c:v>0.69750000000000012</c:v>
                 </c:pt>
                 <c:pt idx="30">
-                  <c:v>0.72</c:v>
+                  <c:v>0.72000000000000008</c:v>
                 </c:pt>
                 <c:pt idx="31">
                   <c:v>0.74249999999999994</c:v>
                 </c:pt>
                 <c:pt idx="32">
-                  <c:v>0.76500000000000001</c:v>
+                  <c:v>0.76500000000000012</c:v>
                 </c:pt>
                 <c:pt idx="33">
                   <c:v>0.78749999999999998</c:v>
@@ -242,13 +252,13 @@
                   <c:v>0.83250000000000002</c:v>
                 </c:pt>
                 <c:pt idx="36">
-                  <c:v>0.85499999999999998</c:v>
+                  <c:v>0.85500000000000009</c:v>
                 </c:pt>
                 <c:pt idx="37">
                   <c:v>0.87749999999999995</c:v>
                 </c:pt>
                 <c:pt idx="38">
-                  <c:v>0.89999999999999991</c:v>
+                  <c:v>0.9</c:v>
                 </c:pt>
                 <c:pt idx="39">
                   <c:v>0.92249999999999999</c:v>
@@ -266,10 +276,10 @@
                   <c:v>1.0125</c:v>
                 </c:pt>
                 <c:pt idx="44">
-                  <c:v>1.0349999999999999</c:v>
+                  <c:v>1.0349999999999997</c:v>
                 </c:pt>
                 <c:pt idx="45">
-                  <c:v>1.0574999999999999</c:v>
+                  <c:v>1.0574999999999997</c:v>
                 </c:pt>
                 <c:pt idx="46">
                   <c:v>1.08</c:v>
@@ -284,16 +294,16 @@
                   <c:v>1.1475</c:v>
                 </c:pt>
                 <c:pt idx="50">
-                  <c:v>1.17</c:v>
+                  <c:v>1.1700000000000002</c:v>
                 </c:pt>
                 <c:pt idx="51">
                   <c:v>1.1924999999999999</c:v>
                 </c:pt>
                 <c:pt idx="52">
-                  <c:v>1.2149999999999999</c:v>
+                  <c:v>1.2149999999999996</c:v>
                 </c:pt>
                 <c:pt idx="53">
-                  <c:v>1.2375</c:v>
+                  <c:v>1.2374999999999998</c:v>
                 </c:pt>
                 <c:pt idx="54">
                   <c:v>1.26</c:v>
@@ -302,13 +312,13 @@
                   <c:v>1.2825</c:v>
                 </c:pt>
                 <c:pt idx="56">
-                  <c:v>1.3049999999999999</c:v>
+                  <c:v>1.3049999999999997</c:v>
                 </c:pt>
                 <c:pt idx="57">
-                  <c:v>1.3274999999999999</c:v>
+                  <c:v>1.3274999999999997</c:v>
                 </c:pt>
                 <c:pt idx="58">
-                  <c:v>1.3499999999999999</c:v>
+                  <c:v>1.3499999999999996</c:v>
                 </c:pt>
                 <c:pt idx="59">
                   <c:v>1.3725000000000001</c:v>
@@ -317,19 +327,19 @@
                   <c:v>1.395</c:v>
                 </c:pt>
                 <c:pt idx="61">
-                  <c:v>1.4175</c:v>
+                  <c:v>1.4174999999999998</c:v>
                 </c:pt>
                 <c:pt idx="62">
                   <c:v>1.44</c:v>
                 </c:pt>
                 <c:pt idx="63">
-                  <c:v>1.4624999999999999</c:v>
+                  <c:v>1.4624999999999997</c:v>
                 </c:pt>
                 <c:pt idx="64">
-                  <c:v>1.4849999999999999</c:v>
+                  <c:v>1.4849999999999997</c:v>
                 </c:pt>
                 <c:pt idx="65">
-                  <c:v>1.5074999999999998</c:v>
+                  <c:v>1.5074999999999996</c:v>
                 </c:pt>
                 <c:pt idx="66">
                   <c:v>1.53</c:v>
@@ -341,10 +351,10 @@
                   <c:v>1.575</c:v>
                 </c:pt>
                 <c:pt idx="69">
-                  <c:v>1.5974999999999999</c:v>
+                  <c:v>1.5974999999999997</c:v>
                 </c:pt>
                 <c:pt idx="70">
-                  <c:v>1.6199999999999999</c:v>
+                  <c:v>1.6199999999999997</c:v>
                 </c:pt>
                 <c:pt idx="71">
                   <c:v>1.6424999999999998</c:v>
@@ -356,7 +366,7 @@
                   <c:v>1.6875</c:v>
                 </c:pt>
                 <c:pt idx="74">
-                  <c:v>1.71</c:v>
+                  <c:v>1.7100000000000002</c:v>
                 </c:pt>
                 <c:pt idx="75">
                   <c:v>1.7324999999999999</c:v>
@@ -380,28 +390,28 @@
                 <c:formatCode>0.00</c:formatCode>
                 <c:ptCount val="79"/>
                 <c:pt idx="0">
-                  <c:v>0.22076372315035811</c:v>
+                  <c:v>0.22076372315035814</c:v>
                 </c:pt>
                 <c:pt idx="1">
-                  <c:v>0.31284916201117319</c:v>
+                  <c:v>0.31284916201117324</c:v>
                 </c:pt>
                 <c:pt idx="2">
-                  <c:v>0.40379296720663771</c:v>
+                  <c:v>0.40379296720663777</c:v>
                 </c:pt>
                 <c:pt idx="3">
-                  <c:v>0.47863247863247876</c:v>
+                  <c:v>0.47863247863247882</c:v>
                 </c:pt>
                 <c:pt idx="4">
-                  <c:v>0.54075546719681911</c:v>
+                  <c:v>0.54075546719681922</c:v>
                 </c:pt>
                 <c:pt idx="5">
-                  <c:v>0.59346528432296586</c:v>
+                  <c:v>0.59346528432296575</c:v>
                 </c:pt>
                 <c:pt idx="6">
-                  <c:v>0.63872135102533167</c:v>
+                  <c:v>0.63872135102533178</c:v>
                 </c:pt>
                 <c:pt idx="7">
-                  <c:v>0.67795620437956206</c:v>
+                  <c:v>0.67795620437956228</c:v>
                 </c:pt>
                 <c:pt idx="8">
                   <c:v>0.71168609610463474</c:v>
@@ -410,25 +420,25 @@
                   <c:v>0.74158553546592487</c:v>
                 </c:pt>
                 <c:pt idx="10">
-                  <c:v>0.76864244741873822</c:v>
+                  <c:v>0.76864244741873844</c:v>
                 </c:pt>
                 <c:pt idx="11">
                   <c:v>0.79241731648292546</c:v>
                 </c:pt>
                 <c:pt idx="12">
-                  <c:v>0.81379310344827593</c:v>
+                  <c:v>0.81379310344827605</c:v>
                 </c:pt>
                 <c:pt idx="13">
-                  <c:v>0.83302752293577997</c:v>
+                  <c:v>0.83302752293578008</c:v>
                 </c:pt>
                 <c:pt idx="14">
-                  <c:v>0.85032425421530466</c:v>
+                  <c:v>0.85032425421530478</c:v>
                 </c:pt>
                 <c:pt idx="15">
-                  <c:v>0.86610125931637116</c:v>
+                  <c:v>0.86610125931637139</c:v>
                 </c:pt>
                 <c:pt idx="16">
-                  <c:v>0.88047910295616727</c:v>
+                  <c:v>0.88047910295616738</c:v>
                 </c:pt>
                 <c:pt idx="17">
                   <c:v>0.89375158107766239</c:v>
@@ -437,25 +447,25 @@
                   <c:v>0.90577889447236193</c:v>
                 </c:pt>
                 <c:pt idx="19">
-                  <c:v>0.91733266733266716</c:v>
+                  <c:v>0.91733266733266705</c:v>
                 </c:pt>
                 <c:pt idx="20">
-                  <c:v>0.92796820665673152</c:v>
+                  <c:v>0.92796820665673163</c:v>
                 </c:pt>
                 <c:pt idx="21">
-                  <c:v>0.93748455646157669</c:v>
+                  <c:v>0.9374845564615768</c:v>
                 </c:pt>
                 <c:pt idx="22">
                   <c:v>0.94663059517953763</c:v>
                 </c:pt>
                 <c:pt idx="23">
-                  <c:v>0.95494613124387828</c:v>
+                  <c:v>0.9549461312438785</c:v>
                 </c:pt>
                 <c:pt idx="24">
-                  <c:v>0.96292682926829276</c:v>
+                  <c:v>0.96292682926829287</c:v>
                 </c:pt>
                 <c:pt idx="25">
-                  <c:v>0.97059538274605106</c:v>
+                  <c:v>0.97059538274605095</c:v>
                 </c:pt>
                 <c:pt idx="26">
                   <c:v>0.97723970944309924</c:v>
@@ -464,10 +474,10 @@
                   <c:v>0.98382814385710826</c:v>
                 </c:pt>
                 <c:pt idx="28">
-                  <c:v>0.99037304452466912</c:v>
+                  <c:v>0.99037304452466901</c:v>
                 </c:pt>
                 <c:pt idx="29">
-                  <c:v>0.99616030717542603</c:v>
+                  <c:v>0.99616030717542592</c:v>
                 </c:pt>
                 <c:pt idx="30">
                   <c:v>1.0016754427955958</c:v>
@@ -485,16 +495,16 @@
                   <c:v>1.0208679155797962</c:v>
                 </c:pt>
                 <c:pt idx="35">
-                  <c:v>1.0253254437869823</c:v>
+                  <c:v>1.0253254437869821</c:v>
                 </c:pt>
                 <c:pt idx="36">
-                  <c:v>1.0292936451689108</c:v>
+                  <c:v>1.0292936451689105</c:v>
                 </c:pt>
                 <c:pt idx="37">
-                  <c:v>1.0330110822919121</c:v>
+                  <c:v>1.0330110822919119</c:v>
                 </c:pt>
                 <c:pt idx="38">
-                  <c:v>1.0369585687382297</c:v>
+                  <c:v>1.0369585687382301</c:v>
                 </c:pt>
                 <c:pt idx="39">
                   <c:v>1.0404230317273797</c:v>
@@ -503,82 +513,82 @@
                   <c:v>1.0441210983337246</c:v>
                 </c:pt>
                 <c:pt idx="41">
-                  <c:v>1.0470946579194003</c:v>
+                  <c:v>1.0470946579193996</c:v>
                 </c:pt>
                 <c:pt idx="42">
-                  <c:v>1.0500701918577446</c:v>
+                  <c:v>1.0500701918577449</c:v>
                 </c:pt>
                 <c:pt idx="43">
-                  <c:v>1.053517176910493</c:v>
+                  <c:v>1.0535171769104932</c:v>
                 </c:pt>
                 <c:pt idx="44">
                   <c:v>1.0562427071178531</c:v>
                 </c:pt>
                 <c:pt idx="45">
-                  <c:v>1.058974358974359</c:v>
+                  <c:v>1.0589743589743588</c:v>
                 </c:pt>
                 <c:pt idx="46">
-                  <c:v>1.0616996507566938</c:v>
+                  <c:v>1.0616996507566936</c:v>
                 </c:pt>
                 <c:pt idx="47">
-                  <c:v>1.0644186046511628</c:v>
+                  <c:v>1.064418604651163</c:v>
                 </c:pt>
                 <c:pt idx="48">
                   <c:v>1.0666666666666664</c:v>
                 </c:pt>
                 <c:pt idx="49">
-                  <c:v>1.0693896495706661</c:v>
+                  <c:v>1.0693896495706658</c:v>
                 </c:pt>
                 <c:pt idx="50">
-                  <c:v>1.0711636532220679</c:v>
+                  <c:v>1.0711636532220676</c:v>
                 </c:pt>
                 <c:pt idx="51">
                   <c:v>1.0736452061139414</c:v>
                 </c:pt>
                 <c:pt idx="52">
-                  <c:v>1.0756594169366034</c:v>
+                  <c:v>1.0756594169366036</c:v>
                 </c:pt>
                 <c:pt idx="53">
-                  <c:v>1.0779010633379562</c:v>
+                  <c:v>1.077901063337956</c:v>
                 </c:pt>
                 <c:pt idx="54">
                   <c:v>1.0796766743648958</c:v>
                 </c:pt>
                 <c:pt idx="55">
-                  <c:v>1.0819293791830142</c:v>
+                  <c:v>1.081929379183014</c:v>
                 </c:pt>
                 <c:pt idx="56">
                   <c:v>1.083698409038506</c:v>
                 </c:pt>
                 <c:pt idx="57">
-                  <c:v>1.0857142857142856</c:v>
+                  <c:v>1.0857142857142854</c:v>
                 </c:pt>
                 <c:pt idx="58">
-                  <c:v>1.0870165745856355</c:v>
+                  <c:v>1.0870165745856357</c:v>
                 </c:pt>
                 <c:pt idx="59">
                   <c:v>1.0887968714055669</c:v>
                 </c:pt>
                 <c:pt idx="60">
-                  <c:v>1.090574712643678</c:v>
+                  <c:v>1.0905747126436778</c:v>
                 </c:pt>
                 <c:pt idx="61">
-                  <c:v>1.0921203767516654</c:v>
+                  <c:v>1.0921203767516656</c:v>
                 </c:pt>
                 <c:pt idx="62">
-                  <c:v>1.0936639118457296</c:v>
+                  <c:v>1.0936639118457299</c:v>
                 </c:pt>
                 <c:pt idx="63">
                   <c:v>1.0952053223216331</c:v>
                 </c:pt>
                 <c:pt idx="64">
-                  <c:v>1.0969961018115113</c:v>
+                  <c:v>1.0969961018115115</c:v>
                 </c:pt>
                 <c:pt idx="65">
-                  <c:v>1.0983043079743355</c:v>
+                  <c:v>1.0983043079743353</c:v>
                 </c:pt>
                 <c:pt idx="66">
-                  <c:v>1.0993817265857568</c:v>
+                  <c:v>1.0993817265857571</c:v>
                 </c:pt>
                 <c:pt idx="67">
                   <c:v>1.1011673151750974</c:v>
@@ -590,22 +600,22 @@
                   <c:v>1.1035665294924555</c:v>
                 </c:pt>
                 <c:pt idx="70">
-                  <c:v>1.1051188299817185</c:v>
+                  <c:v>1.105118829981719</c:v>
                 </c:pt>
                 <c:pt idx="71">
-                  <c:v>1.1064412973960713</c:v>
+                  <c:v>1.1064412973960711</c:v>
                 </c:pt>
                 <c:pt idx="72">
-                  <c:v>1.1070531842045195</c:v>
+                  <c:v>1.1070531842045197</c:v>
                 </c:pt>
                 <c:pt idx="73">
                   <c:v>1.1083732603239791</c:v>
                 </c:pt>
                 <c:pt idx="74">
-                  <c:v>1.1094640820980615</c:v>
+                  <c:v>1.1094640820980612</c:v>
                 </c:pt>
                 <c:pt idx="75">
-                  <c:v>1.1107818554821063</c:v>
+                  <c:v>1.1107818554821061</c:v>
                 </c:pt>
                 <c:pt idx="76">
                   <c:v>1.1116427432216904</c:v>
@@ -614,7 +624,7 @@
                   <c:v>1.1127305852880893</c:v>
                 </c:pt>
                 <c:pt idx="78">
-                  <c:v>1.1138174368313225</c:v>
+                  <c:v>1.1138174368313227</c:v>
                 </c:pt>
               </c:numCache>
             </c:numRef>
@@ -644,13 +654,13 @@
                 <c:formatCode>General</c:formatCode>
                 <c:ptCount val="79"/>
                 <c:pt idx="0">
-                  <c:v>4.4999999999999998E-2</c:v>
+                  <c:v>4.5000000000000012E-2</c:v>
                 </c:pt>
                 <c:pt idx="1">
-                  <c:v>6.7500000000000004E-2</c:v>
+                  <c:v>6.7500000000000018E-2</c:v>
                 </c:pt>
                 <c:pt idx="2">
-                  <c:v>0.09</c:v>
+                  <c:v>9.0000000000000024E-2</c:v>
                 </c:pt>
                 <c:pt idx="3">
                   <c:v>0.11249999999999999</c:v>
@@ -659,52 +669,52 @@
                   <c:v>0.13500000000000001</c:v>
                 </c:pt>
                 <c:pt idx="5">
-                  <c:v>0.1575</c:v>
+                  <c:v>0.15750000000000003</c:v>
                 </c:pt>
                 <c:pt idx="6">
-                  <c:v>0.18</c:v>
+                  <c:v>0.18000000000000002</c:v>
                 </c:pt>
                 <c:pt idx="7">
-                  <c:v>0.20249999999999999</c:v>
+                  <c:v>0.20250000000000001</c:v>
                 </c:pt>
                 <c:pt idx="8">
-                  <c:v>0.22499999999999998</c:v>
+                  <c:v>0.22500000000000003</c:v>
                 </c:pt>
                 <c:pt idx="9">
-                  <c:v>0.2475</c:v>
+                  <c:v>0.24750000000000003</c:v>
                 </c:pt>
                 <c:pt idx="10">
                   <c:v>0.27</c:v>
                 </c:pt>
                 <c:pt idx="11">
-                  <c:v>0.29249999999999998</c:v>
+                  <c:v>0.29250000000000004</c:v>
                 </c:pt>
                 <c:pt idx="12">
-                  <c:v>0.315</c:v>
+                  <c:v>0.31500000000000006</c:v>
                 </c:pt>
                 <c:pt idx="13">
-                  <c:v>0.33749999999999997</c:v>
+                  <c:v>0.33750000000000008</c:v>
                 </c:pt>
                 <c:pt idx="14">
-                  <c:v>0.36</c:v>
+                  <c:v>0.36000000000000004</c:v>
                 </c:pt>
                 <c:pt idx="15">
-                  <c:v>0.38250000000000001</c:v>
+                  <c:v>0.38250000000000006</c:v>
                 </c:pt>
                 <c:pt idx="16">
-                  <c:v>0.40499999999999997</c:v>
+                  <c:v>0.40500000000000003</c:v>
                 </c:pt>
                 <c:pt idx="17">
-                  <c:v>0.42749999999999999</c:v>
+                  <c:v>0.4275000000000001</c:v>
                 </c:pt>
                 <c:pt idx="18">
-                  <c:v>0.44999999999999996</c:v>
+                  <c:v>0.45000000000000007</c:v>
                 </c:pt>
                 <c:pt idx="19">
-                  <c:v>0.47249999999999998</c:v>
+                  <c:v>0.47250000000000003</c:v>
                 </c:pt>
                 <c:pt idx="20">
-                  <c:v>0.495</c:v>
+                  <c:v>0.49500000000000005</c:v>
                 </c:pt>
                 <c:pt idx="21">
                   <c:v>0.51749999999999996</c:v>
@@ -716,31 +726,31 @@
                   <c:v>0.5625</c:v>
                 </c:pt>
                 <c:pt idx="24">
-                  <c:v>0.58499999999999996</c:v>
+                  <c:v>0.58500000000000008</c:v>
                 </c:pt>
                 <c:pt idx="25">
                   <c:v>0.60749999999999993</c:v>
                 </c:pt>
                 <c:pt idx="26">
-                  <c:v>0.63</c:v>
+                  <c:v>0.63000000000000012</c:v>
                 </c:pt>
                 <c:pt idx="27">
-                  <c:v>0.65249999999999997</c:v>
+                  <c:v>0.65250000000000008</c:v>
                 </c:pt>
                 <c:pt idx="28">
-                  <c:v>0.67499999999999993</c:v>
+                  <c:v>0.67500000000000004</c:v>
                 </c:pt>
                 <c:pt idx="29">
-                  <c:v>0.69750000000000001</c:v>
+                  <c:v>0.69750000000000012</c:v>
                 </c:pt>
                 <c:pt idx="30">
-                  <c:v>0.72</c:v>
+                  <c:v>0.72000000000000008</c:v>
                 </c:pt>
                 <c:pt idx="31">
                   <c:v>0.74249999999999994</c:v>
                 </c:pt>
                 <c:pt idx="32">
-                  <c:v>0.76500000000000001</c:v>
+                  <c:v>0.76500000000000012</c:v>
                 </c:pt>
                 <c:pt idx="33">
                   <c:v>0.78749999999999998</c:v>
@@ -752,13 +762,13 @@
                   <c:v>0.83250000000000002</c:v>
                 </c:pt>
                 <c:pt idx="36">
-                  <c:v>0.85499999999999998</c:v>
+                  <c:v>0.85500000000000009</c:v>
                 </c:pt>
                 <c:pt idx="37">
                   <c:v>0.87749999999999995</c:v>
                 </c:pt>
                 <c:pt idx="38">
-                  <c:v>0.89999999999999991</c:v>
+                  <c:v>0.9</c:v>
                 </c:pt>
                 <c:pt idx="39">
                   <c:v>0.92249999999999999</c:v>
@@ -776,10 +786,10 @@
                   <c:v>1.0125</c:v>
                 </c:pt>
                 <c:pt idx="44">
-                  <c:v>1.0349999999999999</c:v>
+                  <c:v>1.0349999999999997</c:v>
                 </c:pt>
                 <c:pt idx="45">
-                  <c:v>1.0574999999999999</c:v>
+                  <c:v>1.0574999999999997</c:v>
                 </c:pt>
                 <c:pt idx="46">
                   <c:v>1.08</c:v>
@@ -794,16 +804,16 @@
                   <c:v>1.1475</c:v>
                 </c:pt>
                 <c:pt idx="50">
-                  <c:v>1.17</c:v>
+                  <c:v>1.1700000000000002</c:v>
                 </c:pt>
                 <c:pt idx="51">
                   <c:v>1.1924999999999999</c:v>
                 </c:pt>
                 <c:pt idx="52">
-                  <c:v>1.2149999999999999</c:v>
+                  <c:v>1.2149999999999996</c:v>
                 </c:pt>
                 <c:pt idx="53">
-                  <c:v>1.2375</c:v>
+                  <c:v>1.2374999999999998</c:v>
                 </c:pt>
                 <c:pt idx="54">
                   <c:v>1.26</c:v>
@@ -812,13 +822,13 @@
                   <c:v>1.2825</c:v>
                 </c:pt>
                 <c:pt idx="56">
-                  <c:v>1.3049999999999999</c:v>
+                  <c:v>1.3049999999999997</c:v>
                 </c:pt>
                 <c:pt idx="57">
-                  <c:v>1.3274999999999999</c:v>
+                  <c:v>1.3274999999999997</c:v>
                 </c:pt>
                 <c:pt idx="58">
-                  <c:v>1.3499999999999999</c:v>
+                  <c:v>1.3499999999999996</c:v>
                 </c:pt>
                 <c:pt idx="59">
                   <c:v>1.3725000000000001</c:v>
@@ -827,19 +837,19 @@
                   <c:v>1.395</c:v>
                 </c:pt>
                 <c:pt idx="61">
-                  <c:v>1.4175</c:v>
+                  <c:v>1.4174999999999998</c:v>
                 </c:pt>
                 <c:pt idx="62">
                   <c:v>1.44</c:v>
                 </c:pt>
                 <c:pt idx="63">
-                  <c:v>1.4624999999999999</c:v>
+                  <c:v>1.4624999999999997</c:v>
                 </c:pt>
                 <c:pt idx="64">
-                  <c:v>1.4849999999999999</c:v>
+                  <c:v>1.4849999999999997</c:v>
                 </c:pt>
                 <c:pt idx="65">
-                  <c:v>1.5074999999999998</c:v>
+                  <c:v>1.5074999999999996</c:v>
                 </c:pt>
                 <c:pt idx="66">
                   <c:v>1.53</c:v>
@@ -851,10 +861,10 @@
                   <c:v>1.575</c:v>
                 </c:pt>
                 <c:pt idx="69">
-                  <c:v>1.5974999999999999</c:v>
+                  <c:v>1.5974999999999997</c:v>
                 </c:pt>
                 <c:pt idx="70">
-                  <c:v>1.6199999999999999</c:v>
+                  <c:v>1.6199999999999997</c:v>
                 </c:pt>
                 <c:pt idx="71">
                   <c:v>1.6424999999999998</c:v>
@@ -866,7 +876,7 @@
                   <c:v>1.6875</c:v>
                 </c:pt>
                 <c:pt idx="74">
-                  <c:v>1.71</c:v>
+                  <c:v>1.7100000000000002</c:v>
                 </c:pt>
                 <c:pt idx="75">
                   <c:v>1.7324999999999999</c:v>
@@ -1131,11 +1141,11 @@
           </c:yVal>
           <c:smooth val="1"/>
         </c:ser>
-        <c:axId val="106361600"/>
-        <c:axId val="108285952"/>
+        <c:axId val="52495872"/>
+        <c:axId val="52497792"/>
       </c:scatterChart>
       <c:valAx>
-        <c:axId val="106361600"/>
+        <c:axId val="52495872"/>
         <c:scaling>
           <c:orientation val="minMax"/>
         </c:scaling>
@@ -1150,31 +1160,42 @@
                   <a:defRPr sz="1400"/>
                 </a:pPr>
                 <a:r>
-                  <a:rPr lang="en-US" sz="1400"/>
-                  <a:t>Access Transistor Width(</a:t>
+                  <a:rPr lang="en-US" sz="1400" dirty="0"/>
+                  <a:t>Access Transistor </a:t>
                 </a:r>
                 <a:r>
-                  <a:rPr lang="el-GR" sz="1400"/>
+                  <a:rPr lang="en-US" sz="1400" dirty="0" smtClean="0"/>
+                  <a:t>Width (</a:t>
+                </a:r>
+                <a:r>
+                  <a:rPr lang="el-GR" sz="1400" dirty="0"/>
                   <a:t>μ</a:t>
                 </a:r>
                 <a:r>
-                  <a:rPr lang="en-US" sz="1400"/>
+                  <a:rPr lang="en-US" sz="1400" dirty="0"/>
                   <a:t>m)</a:t>
                 </a:r>
               </a:p>
             </c:rich>
           </c:tx>
-          <c:layout/>
+          <c:layout>
+            <c:manualLayout>
+              <c:xMode val="edge"/>
+              <c:yMode val="edge"/>
+              <c:x val="0.30317758629227948"/>
+              <c:y val="0.90433333333333332"/>
+            </c:manualLayout>
+          </c:layout>
         </c:title>
         <c:numFmt formatCode="General" sourceLinked="1"/>
         <c:majorTickMark val="none"/>
         <c:tickLblPos val="nextTo"/>
-        <c:crossAx val="108285952"/>
+        <c:crossAx val="52497792"/>
         <c:crosses val="autoZero"/>
         <c:crossBetween val="midCat"/>
       </c:valAx>
       <c:valAx>
-        <c:axId val="108285952"/>
+        <c:axId val="52497792"/>
         <c:scaling>
           <c:orientation val="minMax"/>
         </c:scaling>
@@ -1196,16 +1217,1205 @@
               </a:p>
             </c:rich>
           </c:tx>
-          <c:layout/>
+          <c:layout>
+            <c:manualLayout>
+              <c:xMode val="edge"/>
+              <c:yMode val="edge"/>
+              <c:x val="5.0314465408805034E-2"/>
+              <c:y val="0.31730679498396036"/>
+            </c:manualLayout>
+          </c:layout>
         </c:title>
         <c:numFmt formatCode="0.00" sourceLinked="1"/>
         <c:majorTickMark val="none"/>
         <c:tickLblPos val="nextTo"/>
-        <c:crossAx val="106361600"/>
+        <c:crossAx val="52495872"/>
         <c:crosses val="autoZero"/>
         <c:crossBetween val="midCat"/>
       </c:valAx>
     </c:plotArea>
+    <c:plotVisOnly val="1"/>
+  </c:chart>
+  <c:spPr>
+    <a:noFill/>
+    <a:ln>
+      <a:noFill/>
+    </a:ln>
+  </c:spPr>
+  <c:externalData r:id="rId1"/>
+</c:chartSpace>
+</file>
+
+<file path=ppt/charts/chart2.xml><?xml version="1.0" encoding="utf-8"?>
+<c:chartSpace xmlns:c="http://schemas.openxmlformats.org/drawingml/2006/chart" xmlns:a="http://schemas.openxmlformats.org/drawingml/2006/main" xmlns:r="http://schemas.openxmlformats.org/officeDocument/2006/relationships">
+  <c:lang val="en-US"/>
+  <c:style val="33"/>
+  <c:chart>
+    <c:autoTitleDeleted val="1"/>
+    <c:plotArea>
+      <c:layout>
+        <c:manualLayout>
+          <c:layoutTarget val="inner"/>
+          <c:xMode val="edge"/>
+          <c:yMode val="edge"/>
+          <c:x val="0.17211112761848166"/>
+          <c:y val="5.1624380285797605E-2"/>
+          <c:w val="0.76954239085967868"/>
+          <c:h val="0.75116010498687669"/>
+        </c:manualLayout>
+      </c:layout>
+      <c:scatterChart>
+        <c:scatterStyle val="smoothMarker"/>
+        <c:ser>
+          <c:idx val="0"/>
+          <c:order val="0"/>
+          <c:tx>
+            <c:strRef>
+              <c:f>Sheet1!$C$7</c:f>
+              <c:strCache>
+                <c:ptCount val="1"/>
+                <c:pt idx="0">
+                  <c:v>SL-to-BL Current</c:v>
+                </c:pt>
+              </c:strCache>
+            </c:strRef>
+          </c:tx>
+          <c:spPr>
+            <a:ln w="31750"/>
+          </c:spPr>
+          <c:marker>
+            <c:symbol val="x"/>
+            <c:size val="6"/>
+          </c:marker>
+          <c:xVal>
+            <c:numRef>
+              <c:f>Sheet1!$B$8:$B$86</c:f>
+              <c:numCache>
+                <c:formatCode>General</c:formatCode>
+                <c:ptCount val="79"/>
+                <c:pt idx="0">
+                  <c:v>4.4999999999999998E-2</c:v>
+                </c:pt>
+                <c:pt idx="1">
+                  <c:v>6.7500000000000004E-2</c:v>
+                </c:pt>
+                <c:pt idx="2">
+                  <c:v>0.09</c:v>
+                </c:pt>
+                <c:pt idx="3">
+                  <c:v>0.11249999999999999</c:v>
+                </c:pt>
+                <c:pt idx="4">
+                  <c:v>0.13500000000000001</c:v>
+                </c:pt>
+                <c:pt idx="5">
+                  <c:v>0.1575</c:v>
+                </c:pt>
+                <c:pt idx="6">
+                  <c:v>0.18</c:v>
+                </c:pt>
+                <c:pt idx="7">
+                  <c:v>0.20249999999999999</c:v>
+                </c:pt>
+                <c:pt idx="8">
+                  <c:v>0.22499999999999998</c:v>
+                </c:pt>
+                <c:pt idx="9">
+                  <c:v>0.2475</c:v>
+                </c:pt>
+                <c:pt idx="10">
+                  <c:v>0.27</c:v>
+                </c:pt>
+                <c:pt idx="11">
+                  <c:v>0.29249999999999998</c:v>
+                </c:pt>
+                <c:pt idx="12">
+                  <c:v>0.315</c:v>
+                </c:pt>
+                <c:pt idx="13">
+                  <c:v>0.33749999999999997</c:v>
+                </c:pt>
+                <c:pt idx="14">
+                  <c:v>0.36</c:v>
+                </c:pt>
+                <c:pt idx="15">
+                  <c:v>0.38250000000000001</c:v>
+                </c:pt>
+                <c:pt idx="16">
+                  <c:v>0.40499999999999997</c:v>
+                </c:pt>
+                <c:pt idx="17">
+                  <c:v>0.42749999999999999</c:v>
+                </c:pt>
+                <c:pt idx="18">
+                  <c:v>0.44999999999999996</c:v>
+                </c:pt>
+                <c:pt idx="19">
+                  <c:v>0.47249999999999998</c:v>
+                </c:pt>
+                <c:pt idx="20">
+                  <c:v>0.495</c:v>
+                </c:pt>
+                <c:pt idx="21">
+                  <c:v>0.51749999999999996</c:v>
+                </c:pt>
+                <c:pt idx="22">
+                  <c:v>0.54</c:v>
+                </c:pt>
+                <c:pt idx="23">
+                  <c:v>0.5625</c:v>
+                </c:pt>
+                <c:pt idx="24">
+                  <c:v>0.58499999999999996</c:v>
+                </c:pt>
+                <c:pt idx="25">
+                  <c:v>0.60749999999999993</c:v>
+                </c:pt>
+                <c:pt idx="26">
+                  <c:v>0.63</c:v>
+                </c:pt>
+                <c:pt idx="27">
+                  <c:v>0.65249999999999997</c:v>
+                </c:pt>
+                <c:pt idx="28">
+                  <c:v>0.67499999999999993</c:v>
+                </c:pt>
+                <c:pt idx="29">
+                  <c:v>0.69750000000000001</c:v>
+                </c:pt>
+                <c:pt idx="30">
+                  <c:v>0.72</c:v>
+                </c:pt>
+                <c:pt idx="31">
+                  <c:v>0.74249999999999994</c:v>
+                </c:pt>
+                <c:pt idx="32">
+                  <c:v>0.76500000000000001</c:v>
+                </c:pt>
+                <c:pt idx="33">
+                  <c:v>0.78749999999999998</c:v>
+                </c:pt>
+                <c:pt idx="34">
+                  <c:v>0.80999999999999994</c:v>
+                </c:pt>
+                <c:pt idx="35">
+                  <c:v>0.83250000000000002</c:v>
+                </c:pt>
+                <c:pt idx="36">
+                  <c:v>0.85499999999999998</c:v>
+                </c:pt>
+                <c:pt idx="37">
+                  <c:v>0.87749999999999995</c:v>
+                </c:pt>
+                <c:pt idx="38">
+                  <c:v>0.89999999999999991</c:v>
+                </c:pt>
+                <c:pt idx="39">
+                  <c:v>0.92249999999999999</c:v>
+                </c:pt>
+                <c:pt idx="40">
+                  <c:v>0.94499999999999995</c:v>
+                </c:pt>
+                <c:pt idx="41">
+                  <c:v>0.96749999999999992</c:v>
+                </c:pt>
+                <c:pt idx="42">
+                  <c:v>0.99</c:v>
+                </c:pt>
+                <c:pt idx="43">
+                  <c:v>1.0125</c:v>
+                </c:pt>
+                <c:pt idx="44">
+                  <c:v>1.0349999999999999</c:v>
+                </c:pt>
+                <c:pt idx="45">
+                  <c:v>1.0574999999999999</c:v>
+                </c:pt>
+                <c:pt idx="46">
+                  <c:v>1.08</c:v>
+                </c:pt>
+                <c:pt idx="47">
+                  <c:v>1.1025</c:v>
+                </c:pt>
+                <c:pt idx="48">
+                  <c:v>1.125</c:v>
+                </c:pt>
+                <c:pt idx="49">
+                  <c:v>1.1475</c:v>
+                </c:pt>
+                <c:pt idx="50">
+                  <c:v>1.17</c:v>
+                </c:pt>
+                <c:pt idx="51">
+                  <c:v>1.1924999999999999</c:v>
+                </c:pt>
+                <c:pt idx="52">
+                  <c:v>1.2149999999999999</c:v>
+                </c:pt>
+                <c:pt idx="53">
+                  <c:v>1.2375</c:v>
+                </c:pt>
+                <c:pt idx="54">
+                  <c:v>1.26</c:v>
+                </c:pt>
+                <c:pt idx="55">
+                  <c:v>1.2825</c:v>
+                </c:pt>
+                <c:pt idx="56">
+                  <c:v>1.3049999999999999</c:v>
+                </c:pt>
+                <c:pt idx="57">
+                  <c:v>1.3274999999999999</c:v>
+                </c:pt>
+                <c:pt idx="58">
+                  <c:v>1.3499999999999999</c:v>
+                </c:pt>
+                <c:pt idx="59">
+                  <c:v>1.3725000000000001</c:v>
+                </c:pt>
+                <c:pt idx="60">
+                  <c:v>1.395</c:v>
+                </c:pt>
+                <c:pt idx="61">
+                  <c:v>1.4175</c:v>
+                </c:pt>
+                <c:pt idx="62">
+                  <c:v>1.44</c:v>
+                </c:pt>
+                <c:pt idx="63">
+                  <c:v>1.4624999999999999</c:v>
+                </c:pt>
+                <c:pt idx="64">
+                  <c:v>1.4849999999999999</c:v>
+                </c:pt>
+                <c:pt idx="65">
+                  <c:v>1.5074999999999998</c:v>
+                </c:pt>
+                <c:pt idx="66">
+                  <c:v>1.53</c:v>
+                </c:pt>
+                <c:pt idx="67">
+                  <c:v>1.5525</c:v>
+                </c:pt>
+                <c:pt idx="68">
+                  <c:v>1.575</c:v>
+                </c:pt>
+                <c:pt idx="69">
+                  <c:v>1.5974999999999999</c:v>
+                </c:pt>
+                <c:pt idx="70">
+                  <c:v>1.6199999999999999</c:v>
+                </c:pt>
+                <c:pt idx="71">
+                  <c:v>1.6424999999999998</c:v>
+                </c:pt>
+                <c:pt idx="72">
+                  <c:v>1.665</c:v>
+                </c:pt>
+                <c:pt idx="73">
+                  <c:v>1.6875</c:v>
+                </c:pt>
+                <c:pt idx="74">
+                  <c:v>1.71</c:v>
+                </c:pt>
+                <c:pt idx="75">
+                  <c:v>1.7324999999999999</c:v>
+                </c:pt>
+                <c:pt idx="76">
+                  <c:v>1.7549999999999999</c:v>
+                </c:pt>
+                <c:pt idx="77">
+                  <c:v>1.7774999999999999</c:v>
+                </c:pt>
+                <c:pt idx="78">
+                  <c:v>1.7999999999999998</c:v>
+                </c:pt>
+              </c:numCache>
+            </c:numRef>
+          </c:xVal>
+          <c:yVal>
+            <c:numRef>
+              <c:f>Sheet1!$C$8:$C$86</c:f>
+              <c:numCache>
+                <c:formatCode>0.00</c:formatCode>
+                <c:ptCount val="79"/>
+                <c:pt idx="0">
+                  <c:v>40.47</c:v>
+                </c:pt>
+                <c:pt idx="1">
+                  <c:v>57.03</c:v>
+                </c:pt>
+                <c:pt idx="2">
+                  <c:v>75.02</c:v>
+                </c:pt>
+                <c:pt idx="3">
+                  <c:v>90.44</c:v>
+                </c:pt>
+                <c:pt idx="4">
+                  <c:v>103.9</c:v>
+                </c:pt>
+                <c:pt idx="5">
+                  <c:v>115.69999999999999</c:v>
+                </c:pt>
+                <c:pt idx="6">
+                  <c:v>126.2</c:v>
+                </c:pt>
+                <c:pt idx="7">
+                  <c:v>135.6</c:v>
+                </c:pt>
+                <c:pt idx="8">
+                  <c:v>144</c:v>
+                </c:pt>
+                <c:pt idx="9">
+                  <c:v>151.69999999999999</c:v>
+                </c:pt>
+                <c:pt idx="10">
+                  <c:v>158.70000000000002</c:v>
+                </c:pt>
+                <c:pt idx="11">
+                  <c:v>165.1</c:v>
+                </c:pt>
+                <c:pt idx="12">
+                  <c:v>170.9</c:v>
+                </c:pt>
+                <c:pt idx="13">
+                  <c:v>176.3</c:v>
+                </c:pt>
+                <c:pt idx="14">
+                  <c:v>181.29999999999998</c:v>
+                </c:pt>
+                <c:pt idx="15">
+                  <c:v>186</c:v>
+                </c:pt>
+                <c:pt idx="16">
+                  <c:v>190.29999999999998</c:v>
+                </c:pt>
+                <c:pt idx="17">
+                  <c:v>194.3</c:v>
+                </c:pt>
+                <c:pt idx="18">
+                  <c:v>198.1</c:v>
+                </c:pt>
+                <c:pt idx="19">
+                  <c:v>201.6</c:v>
+                </c:pt>
+                <c:pt idx="20">
+                  <c:v>205</c:v>
+                </c:pt>
+                <c:pt idx="21">
+                  <c:v>208.1</c:v>
+                </c:pt>
+                <c:pt idx="22">
+                  <c:v>211</c:v>
+                </c:pt>
+                <c:pt idx="23">
+                  <c:v>213.79999999999998</c:v>
+                </c:pt>
+                <c:pt idx="24">
+                  <c:v>216.5</c:v>
+                </c:pt>
+                <c:pt idx="25">
+                  <c:v>219</c:v>
+                </c:pt>
+                <c:pt idx="26">
+                  <c:v>221.3</c:v>
+                </c:pt>
+                <c:pt idx="27">
+                  <c:v>223.6</c:v>
+                </c:pt>
+                <c:pt idx="28">
+                  <c:v>225.70000000000002</c:v>
+                </c:pt>
+                <c:pt idx="29">
+                  <c:v>227.8</c:v>
+                </c:pt>
+                <c:pt idx="30">
+                  <c:v>229.8</c:v>
+                </c:pt>
+                <c:pt idx="31">
+                  <c:v>231.6</c:v>
+                </c:pt>
+                <c:pt idx="32">
+                  <c:v>233.4</c:v>
+                </c:pt>
+                <c:pt idx="33">
+                  <c:v>235.1</c:v>
+                </c:pt>
+                <c:pt idx="34">
+                  <c:v>236.8</c:v>
+                </c:pt>
+                <c:pt idx="35">
+                  <c:v>238.29999999999998</c:v>
+                </c:pt>
+                <c:pt idx="36">
+                  <c:v>239.9</c:v>
+                </c:pt>
+                <c:pt idx="37">
+                  <c:v>241.3</c:v>
+                </c:pt>
+                <c:pt idx="38">
+                  <c:v>242.7</c:v>
+                </c:pt>
+                <c:pt idx="39">
+                  <c:v>244.1</c:v>
+                </c:pt>
+                <c:pt idx="40">
+                  <c:v>245.4</c:v>
+                </c:pt>
+                <c:pt idx="41">
+                  <c:v>246.59999999999997</c:v>
+                </c:pt>
+                <c:pt idx="42">
+                  <c:v>247.8</c:v>
+                </c:pt>
+                <c:pt idx="43">
+                  <c:v>248.99999999999997</c:v>
+                </c:pt>
+                <c:pt idx="44">
+                  <c:v>250.1</c:v>
+                </c:pt>
+                <c:pt idx="45">
+                  <c:v>251.2</c:v>
+                </c:pt>
+                <c:pt idx="46">
+                  <c:v>252.3</c:v>
+                </c:pt>
+                <c:pt idx="47">
+                  <c:v>253.29999999999998</c:v>
+                </c:pt>
+                <c:pt idx="48">
+                  <c:v>254.3</c:v>
+                </c:pt>
+                <c:pt idx="49">
+                  <c:v>255.30000000000004</c:v>
+                </c:pt>
+                <c:pt idx="50">
+                  <c:v>256.2</c:v>
+                </c:pt>
+                <c:pt idx="51">
+                  <c:v>257.10000000000002</c:v>
+                </c:pt>
+                <c:pt idx="52">
+                  <c:v>258</c:v>
+                </c:pt>
+                <c:pt idx="53">
+                  <c:v>258.8</c:v>
+                </c:pt>
+                <c:pt idx="54">
+                  <c:v>259.70000000000005</c:v>
+                </c:pt>
+                <c:pt idx="55">
+                  <c:v>260.5</c:v>
+                </c:pt>
+                <c:pt idx="56">
+                  <c:v>261.3</c:v>
+                </c:pt>
+                <c:pt idx="57">
+                  <c:v>262</c:v>
+                </c:pt>
+                <c:pt idx="58">
+                  <c:v>262.8</c:v>
+                </c:pt>
+                <c:pt idx="59">
+                  <c:v>263.5</c:v>
+                </c:pt>
+                <c:pt idx="60">
+                  <c:v>264.20000000000005</c:v>
+                </c:pt>
+                <c:pt idx="61">
+                  <c:v>264.89999999999998</c:v>
+                </c:pt>
+                <c:pt idx="62">
+                  <c:v>265.60000000000002</c:v>
+                </c:pt>
+                <c:pt idx="63">
+                  <c:v>266.20000000000005</c:v>
+                </c:pt>
+                <c:pt idx="64">
+                  <c:v>266.89999999999998</c:v>
+                </c:pt>
+                <c:pt idx="65">
+                  <c:v>267.5</c:v>
+                </c:pt>
+                <c:pt idx="66">
+                  <c:v>268.10000000000002</c:v>
+                </c:pt>
+                <c:pt idx="67">
+                  <c:v>268.70000000000005</c:v>
+                </c:pt>
+                <c:pt idx="68">
+                  <c:v>269.3</c:v>
+                </c:pt>
+                <c:pt idx="69">
+                  <c:v>269.8</c:v>
+                </c:pt>
+                <c:pt idx="70">
+                  <c:v>270.40000000000003</c:v>
+                </c:pt>
+                <c:pt idx="71">
+                  <c:v>271</c:v>
+                </c:pt>
+                <c:pt idx="72">
+                  <c:v>271.5</c:v>
+                </c:pt>
+                <c:pt idx="73">
+                  <c:v>272</c:v>
+                </c:pt>
+                <c:pt idx="74">
+                  <c:v>272.5</c:v>
+                </c:pt>
+                <c:pt idx="75">
+                  <c:v>273</c:v>
+                </c:pt>
+                <c:pt idx="76">
+                  <c:v>273.5</c:v>
+                </c:pt>
+                <c:pt idx="77">
+                  <c:v>274</c:v>
+                </c:pt>
+                <c:pt idx="78">
+                  <c:v>274.5</c:v>
+                </c:pt>
+              </c:numCache>
+            </c:numRef>
+          </c:yVal>
+          <c:smooth val="1"/>
+        </c:ser>
+        <c:ser>
+          <c:idx val="1"/>
+          <c:order val="1"/>
+          <c:tx>
+            <c:strRef>
+              <c:f>Sheet1!$D$7</c:f>
+              <c:strCache>
+                <c:ptCount val="1"/>
+                <c:pt idx="0">
+                  <c:v>BL-to-SL Current</c:v>
+                </c:pt>
+              </c:strCache>
+            </c:strRef>
+          </c:tx>
+          <c:spPr>
+            <a:ln w="31750"/>
+          </c:spPr>
+          <c:marker>
+            <c:symbol val="circle"/>
+            <c:size val="5"/>
+          </c:marker>
+          <c:xVal>
+            <c:numRef>
+              <c:f>Sheet1!$B$8:$B$86</c:f>
+              <c:numCache>
+                <c:formatCode>General</c:formatCode>
+                <c:ptCount val="79"/>
+                <c:pt idx="0">
+                  <c:v>4.4999999999999998E-2</c:v>
+                </c:pt>
+                <c:pt idx="1">
+                  <c:v>6.7500000000000004E-2</c:v>
+                </c:pt>
+                <c:pt idx="2">
+                  <c:v>0.09</c:v>
+                </c:pt>
+                <c:pt idx="3">
+                  <c:v>0.11249999999999999</c:v>
+                </c:pt>
+                <c:pt idx="4">
+                  <c:v>0.13500000000000001</c:v>
+                </c:pt>
+                <c:pt idx="5">
+                  <c:v>0.1575</c:v>
+                </c:pt>
+                <c:pt idx="6">
+                  <c:v>0.18</c:v>
+                </c:pt>
+                <c:pt idx="7">
+                  <c:v>0.20249999999999999</c:v>
+                </c:pt>
+                <c:pt idx="8">
+                  <c:v>0.22499999999999998</c:v>
+                </c:pt>
+                <c:pt idx="9">
+                  <c:v>0.2475</c:v>
+                </c:pt>
+                <c:pt idx="10">
+                  <c:v>0.27</c:v>
+                </c:pt>
+                <c:pt idx="11">
+                  <c:v>0.29249999999999998</c:v>
+                </c:pt>
+                <c:pt idx="12">
+                  <c:v>0.315</c:v>
+                </c:pt>
+                <c:pt idx="13">
+                  <c:v>0.33749999999999997</c:v>
+                </c:pt>
+                <c:pt idx="14">
+                  <c:v>0.36</c:v>
+                </c:pt>
+                <c:pt idx="15">
+                  <c:v>0.38250000000000001</c:v>
+                </c:pt>
+                <c:pt idx="16">
+                  <c:v>0.40499999999999997</c:v>
+                </c:pt>
+                <c:pt idx="17">
+                  <c:v>0.42749999999999999</c:v>
+                </c:pt>
+                <c:pt idx="18">
+                  <c:v>0.44999999999999996</c:v>
+                </c:pt>
+                <c:pt idx="19">
+                  <c:v>0.47249999999999998</c:v>
+                </c:pt>
+                <c:pt idx="20">
+                  <c:v>0.495</c:v>
+                </c:pt>
+                <c:pt idx="21">
+                  <c:v>0.51749999999999996</c:v>
+                </c:pt>
+                <c:pt idx="22">
+                  <c:v>0.54</c:v>
+                </c:pt>
+                <c:pt idx="23">
+                  <c:v>0.5625</c:v>
+                </c:pt>
+                <c:pt idx="24">
+                  <c:v>0.58499999999999996</c:v>
+                </c:pt>
+                <c:pt idx="25">
+                  <c:v>0.60749999999999993</c:v>
+                </c:pt>
+                <c:pt idx="26">
+                  <c:v>0.63</c:v>
+                </c:pt>
+                <c:pt idx="27">
+                  <c:v>0.65249999999999997</c:v>
+                </c:pt>
+                <c:pt idx="28">
+                  <c:v>0.67499999999999993</c:v>
+                </c:pt>
+                <c:pt idx="29">
+                  <c:v>0.69750000000000001</c:v>
+                </c:pt>
+                <c:pt idx="30">
+                  <c:v>0.72</c:v>
+                </c:pt>
+                <c:pt idx="31">
+                  <c:v>0.74249999999999994</c:v>
+                </c:pt>
+                <c:pt idx="32">
+                  <c:v>0.76500000000000001</c:v>
+                </c:pt>
+                <c:pt idx="33">
+                  <c:v>0.78749999999999998</c:v>
+                </c:pt>
+                <c:pt idx="34">
+                  <c:v>0.80999999999999994</c:v>
+                </c:pt>
+                <c:pt idx="35">
+                  <c:v>0.83250000000000002</c:v>
+                </c:pt>
+                <c:pt idx="36">
+                  <c:v>0.85499999999999998</c:v>
+                </c:pt>
+                <c:pt idx="37">
+                  <c:v>0.87749999999999995</c:v>
+                </c:pt>
+                <c:pt idx="38">
+                  <c:v>0.89999999999999991</c:v>
+                </c:pt>
+                <c:pt idx="39">
+                  <c:v>0.92249999999999999</c:v>
+                </c:pt>
+                <c:pt idx="40">
+                  <c:v>0.94499999999999995</c:v>
+                </c:pt>
+                <c:pt idx="41">
+                  <c:v>0.96749999999999992</c:v>
+                </c:pt>
+                <c:pt idx="42">
+                  <c:v>0.99</c:v>
+                </c:pt>
+                <c:pt idx="43">
+                  <c:v>1.0125</c:v>
+                </c:pt>
+                <c:pt idx="44">
+                  <c:v>1.0349999999999999</c:v>
+                </c:pt>
+                <c:pt idx="45">
+                  <c:v>1.0574999999999999</c:v>
+                </c:pt>
+                <c:pt idx="46">
+                  <c:v>1.08</c:v>
+                </c:pt>
+                <c:pt idx="47">
+                  <c:v>1.1025</c:v>
+                </c:pt>
+                <c:pt idx="48">
+                  <c:v>1.125</c:v>
+                </c:pt>
+                <c:pt idx="49">
+                  <c:v>1.1475</c:v>
+                </c:pt>
+                <c:pt idx="50">
+                  <c:v>1.17</c:v>
+                </c:pt>
+                <c:pt idx="51">
+                  <c:v>1.1924999999999999</c:v>
+                </c:pt>
+                <c:pt idx="52">
+                  <c:v>1.2149999999999999</c:v>
+                </c:pt>
+                <c:pt idx="53">
+                  <c:v>1.2375</c:v>
+                </c:pt>
+                <c:pt idx="54">
+                  <c:v>1.26</c:v>
+                </c:pt>
+                <c:pt idx="55">
+                  <c:v>1.2825</c:v>
+                </c:pt>
+                <c:pt idx="56">
+                  <c:v>1.3049999999999999</c:v>
+                </c:pt>
+                <c:pt idx="57">
+                  <c:v>1.3274999999999999</c:v>
+                </c:pt>
+                <c:pt idx="58">
+                  <c:v>1.3499999999999999</c:v>
+                </c:pt>
+                <c:pt idx="59">
+                  <c:v>1.3725000000000001</c:v>
+                </c:pt>
+                <c:pt idx="60">
+                  <c:v>1.395</c:v>
+                </c:pt>
+                <c:pt idx="61">
+                  <c:v>1.4175</c:v>
+                </c:pt>
+                <c:pt idx="62">
+                  <c:v>1.44</c:v>
+                </c:pt>
+                <c:pt idx="63">
+                  <c:v>1.4624999999999999</c:v>
+                </c:pt>
+                <c:pt idx="64">
+                  <c:v>1.4849999999999999</c:v>
+                </c:pt>
+                <c:pt idx="65">
+                  <c:v>1.5074999999999998</c:v>
+                </c:pt>
+                <c:pt idx="66">
+                  <c:v>1.53</c:v>
+                </c:pt>
+                <c:pt idx="67">
+                  <c:v>1.5525</c:v>
+                </c:pt>
+                <c:pt idx="68">
+                  <c:v>1.575</c:v>
+                </c:pt>
+                <c:pt idx="69">
+                  <c:v>1.5974999999999999</c:v>
+                </c:pt>
+                <c:pt idx="70">
+                  <c:v>1.6199999999999999</c:v>
+                </c:pt>
+                <c:pt idx="71">
+                  <c:v>1.6424999999999998</c:v>
+                </c:pt>
+                <c:pt idx="72">
+                  <c:v>1.665</c:v>
+                </c:pt>
+                <c:pt idx="73">
+                  <c:v>1.6875</c:v>
+                </c:pt>
+                <c:pt idx="74">
+                  <c:v>1.71</c:v>
+                </c:pt>
+                <c:pt idx="75">
+                  <c:v>1.7324999999999999</c:v>
+                </c:pt>
+                <c:pt idx="76">
+                  <c:v>1.7549999999999999</c:v>
+                </c:pt>
+                <c:pt idx="77">
+                  <c:v>1.7774999999999999</c:v>
+                </c:pt>
+                <c:pt idx="78">
+                  <c:v>1.7999999999999998</c:v>
+                </c:pt>
+              </c:numCache>
+            </c:numRef>
+          </c:xVal>
+          <c:yVal>
+            <c:numRef>
+              <c:f>Sheet1!$D$8:$D$86</c:f>
+              <c:numCache>
+                <c:formatCode>0.00</c:formatCode>
+                <c:ptCount val="79"/>
+                <c:pt idx="0">
+                  <c:v>44.7</c:v>
+                </c:pt>
+                <c:pt idx="1">
+                  <c:v>66.180000000000007</c:v>
+                </c:pt>
+                <c:pt idx="2">
+                  <c:v>91.24</c:v>
+                </c:pt>
+                <c:pt idx="3">
+                  <c:v>113.4</c:v>
+                </c:pt>
+                <c:pt idx="4">
+                  <c:v>132.5</c:v>
+                </c:pt>
+                <c:pt idx="5">
+                  <c:v>148.89999999999998</c:v>
+                </c:pt>
+                <c:pt idx="6">
+                  <c:v>163.1</c:v>
+                </c:pt>
+                <c:pt idx="7">
+                  <c:v>175.3</c:v>
+                </c:pt>
+                <c:pt idx="8">
+                  <c:v>186.1</c:v>
+                </c:pt>
+                <c:pt idx="9">
+                  <c:v>195.5</c:v>
+                </c:pt>
+                <c:pt idx="10">
+                  <c:v>203.9</c:v>
+                </c:pt>
+                <c:pt idx="11">
+                  <c:v>211.3</c:v>
+                </c:pt>
+                <c:pt idx="12">
+                  <c:v>218</c:v>
+                </c:pt>
+                <c:pt idx="13">
+                  <c:v>224</c:v>
+                </c:pt>
+                <c:pt idx="14">
+                  <c:v>229.5</c:v>
+                </c:pt>
+                <c:pt idx="15">
+                  <c:v>234.4</c:v>
+                </c:pt>
+                <c:pt idx="16">
+                  <c:v>238.9</c:v>
+                </c:pt>
+                <c:pt idx="17">
+                  <c:v>243</c:v>
+                </c:pt>
+                <c:pt idx="18">
+                  <c:v>246.79999999999998</c:v>
+                </c:pt>
+                <c:pt idx="19">
+                  <c:v>250.3</c:v>
+                </c:pt>
+                <c:pt idx="20">
+                  <c:v>253.49999999999997</c:v>
+                </c:pt>
+                <c:pt idx="21">
+                  <c:v>256.5</c:v>
+                </c:pt>
+                <c:pt idx="22">
+                  <c:v>259.2</c:v>
+                </c:pt>
+                <c:pt idx="23">
+                  <c:v>261.8</c:v>
+                </c:pt>
+                <c:pt idx="24">
+                  <c:v>264.20000000000005</c:v>
+                </c:pt>
+                <c:pt idx="25">
+                  <c:v>266.5</c:v>
+                </c:pt>
+                <c:pt idx="26">
+                  <c:v>268.60000000000002</c:v>
+                </c:pt>
+                <c:pt idx="27">
+                  <c:v>270.60000000000002</c:v>
+                </c:pt>
+                <c:pt idx="28">
+                  <c:v>272.5</c:v>
+                </c:pt>
+                <c:pt idx="29">
+                  <c:v>274.2</c:v>
+                </c:pt>
+                <c:pt idx="30">
+                  <c:v>275.89999999999998</c:v>
+                </c:pt>
+                <c:pt idx="31">
+                  <c:v>277.5</c:v>
+                </c:pt>
+                <c:pt idx="32">
+                  <c:v>278.89999999999998</c:v>
+                </c:pt>
+                <c:pt idx="33">
+                  <c:v>280.39999999999998</c:v>
+                </c:pt>
+                <c:pt idx="34">
+                  <c:v>281.7</c:v>
+                </c:pt>
+                <c:pt idx="35">
+                  <c:v>283</c:v>
+                </c:pt>
+                <c:pt idx="36">
+                  <c:v>284.20000000000005</c:v>
+                </c:pt>
+                <c:pt idx="37">
+                  <c:v>285.3</c:v>
+                </c:pt>
+                <c:pt idx="38">
+                  <c:v>286.5</c:v>
+                </c:pt>
+                <c:pt idx="39">
+                  <c:v>287.5</c:v>
+                </c:pt>
+                <c:pt idx="40">
+                  <c:v>288.5</c:v>
+                </c:pt>
+                <c:pt idx="41">
+                  <c:v>289.5</c:v>
+                </c:pt>
+                <c:pt idx="42">
+                  <c:v>290.40000000000003</c:v>
+                </c:pt>
+                <c:pt idx="43">
+                  <c:v>291.29999999999995</c:v>
+                </c:pt>
+                <c:pt idx="44">
+                  <c:v>292.10000000000002</c:v>
+                </c:pt>
+                <c:pt idx="45">
+                  <c:v>293</c:v>
+                </c:pt>
+                <c:pt idx="46">
+                  <c:v>293.8</c:v>
+                </c:pt>
+                <c:pt idx="47">
+                  <c:v>294.5</c:v>
+                </c:pt>
+                <c:pt idx="48">
+                  <c:v>295.20000000000005</c:v>
+                </c:pt>
+                <c:pt idx="49">
+                  <c:v>295.89999999999998</c:v>
+                </c:pt>
+                <c:pt idx="50">
+                  <c:v>296.60000000000002</c:v>
+                </c:pt>
+                <c:pt idx="51">
+                  <c:v>297.3</c:v>
+                </c:pt>
+                <c:pt idx="52">
+                  <c:v>297.89999999999998</c:v>
+                </c:pt>
+                <c:pt idx="53">
+                  <c:v>298.5</c:v>
+                </c:pt>
+                <c:pt idx="54">
+                  <c:v>299.10000000000002</c:v>
+                </c:pt>
+                <c:pt idx="55">
+                  <c:v>299.70000000000005</c:v>
+                </c:pt>
+                <c:pt idx="56">
+                  <c:v>300.2</c:v>
+                </c:pt>
+                <c:pt idx="57">
+                  <c:v>300.7</c:v>
+                </c:pt>
+                <c:pt idx="58">
+                  <c:v>301.3</c:v>
+                </c:pt>
+                <c:pt idx="59">
+                  <c:v>301.8</c:v>
+                </c:pt>
+                <c:pt idx="60">
+                  <c:v>302.2</c:v>
+                </c:pt>
+                <c:pt idx="61">
+                  <c:v>302.7</c:v>
+                </c:pt>
+                <c:pt idx="62">
+                  <c:v>303.2</c:v>
+                </c:pt>
+                <c:pt idx="63">
+                  <c:v>303.60000000000002</c:v>
+                </c:pt>
+                <c:pt idx="64">
+                  <c:v>304</c:v>
+                </c:pt>
+                <c:pt idx="65">
+                  <c:v>304.40000000000003</c:v>
+                </c:pt>
+                <c:pt idx="66">
+                  <c:v>304.89999999999998</c:v>
+                </c:pt>
+                <c:pt idx="67">
+                  <c:v>305.2</c:v>
+                </c:pt>
+                <c:pt idx="68">
+                  <c:v>305.60000000000002</c:v>
+                </c:pt>
+                <c:pt idx="69">
+                  <c:v>306</c:v>
+                </c:pt>
+                <c:pt idx="70">
+                  <c:v>306.40000000000003</c:v>
+                </c:pt>
+                <c:pt idx="71">
+                  <c:v>306.7</c:v>
+                </c:pt>
+                <c:pt idx="72">
+                  <c:v>307.09999999999997</c:v>
+                </c:pt>
+                <c:pt idx="73">
+                  <c:v>307.39999999999998</c:v>
+                </c:pt>
+                <c:pt idx="74">
+                  <c:v>307.7</c:v>
+                </c:pt>
+                <c:pt idx="75">
+                  <c:v>308.10000000000002</c:v>
+                </c:pt>
+                <c:pt idx="76">
+                  <c:v>308.40000000000003</c:v>
+                </c:pt>
+                <c:pt idx="77">
+                  <c:v>308.70000000000005</c:v>
+                </c:pt>
+                <c:pt idx="78">
+                  <c:v>309</c:v>
+                </c:pt>
+              </c:numCache>
+            </c:numRef>
+          </c:yVal>
+          <c:smooth val="1"/>
+        </c:ser>
+        <c:axId val="54622848"/>
+        <c:axId val="54795264"/>
+      </c:scatterChart>
+      <c:valAx>
+        <c:axId val="54622848"/>
+        <c:scaling>
+          <c:orientation val="minMax"/>
+        </c:scaling>
+        <c:axPos val="b"/>
+        <c:title>
+          <c:tx>
+            <c:rich>
+              <a:bodyPr/>
+              <a:lstStyle/>
+              <a:p>
+                <a:pPr>
+                  <a:defRPr sz="1400"/>
+                </a:pPr>
+                <a:r>
+                  <a:rPr lang="en-US" sz="1400" dirty="0"/>
+                  <a:t>Access Transistor Width (</a:t>
+                </a:r>
+                <a:r>
+                  <a:rPr lang="el-GR" sz="1400" dirty="0"/>
+                  <a:t>μ</a:t>
+                </a:r>
+                <a:r>
+                  <a:rPr lang="en-US" sz="1400" dirty="0"/>
+                  <a:t>m)</a:t>
+                </a:r>
+              </a:p>
+            </c:rich>
+          </c:tx>
+          <c:layout>
+            <c:manualLayout>
+              <c:xMode val="edge"/>
+              <c:yMode val="edge"/>
+              <c:x val="0.31320884864595677"/>
+              <c:y val="0.90177759986344563"/>
+            </c:manualLayout>
+          </c:layout>
+        </c:title>
+        <c:numFmt formatCode="General" sourceLinked="1"/>
+        <c:majorTickMark val="none"/>
+        <c:tickLblPos val="nextTo"/>
+        <c:crossAx val="54795264"/>
+        <c:crosses val="autoZero"/>
+        <c:crossBetween val="midCat"/>
+      </c:valAx>
+      <c:valAx>
+        <c:axId val="54795264"/>
+        <c:scaling>
+          <c:orientation val="minMax"/>
+        </c:scaling>
+        <c:axPos val="l"/>
+        <c:majorGridlines/>
+        <c:title>
+          <c:tx>
+            <c:rich>
+              <a:bodyPr/>
+              <a:lstStyle/>
+              <a:p>
+                <a:pPr>
+                  <a:defRPr sz="1400"/>
+                </a:pPr>
+                <a:r>
+                  <a:rPr lang="en-US" sz="1400"/>
+                  <a:t>Cell Write Current (</a:t>
+                </a:r>
+                <a:r>
+                  <a:rPr lang="el-GR" sz="1400" b="1" i="0" u="none" strike="noStrike" baseline="0"/>
+                  <a:t>μ</a:t>
+                </a:r>
+                <a:r>
+                  <a:rPr lang="en-US" sz="1400"/>
+                  <a:t>A)</a:t>
+                </a:r>
+              </a:p>
+            </c:rich>
+          </c:tx>
+          <c:layout>
+            <c:manualLayout>
+              <c:xMode val="edge"/>
+              <c:yMode val="edge"/>
+              <c:x val="1.640213114199271E-2"/>
+              <c:y val="0.10875394459761979"/>
+            </c:manualLayout>
+          </c:layout>
+        </c:title>
+        <c:numFmt formatCode="0" sourceLinked="0"/>
+        <c:majorTickMark val="none"/>
+        <c:tickLblPos val="nextTo"/>
+        <c:crossAx val="54622848"/>
+        <c:crosses val="autoZero"/>
+        <c:crossBetween val="midCat"/>
+      </c:valAx>
+    </c:plotArea>
+    <c:legend>
+      <c:legendPos val="r"/>
+      <c:layout>
+        <c:manualLayout>
+          <c:xMode val="edge"/>
+          <c:yMode val="edge"/>
+          <c:x val="0.48036757529971114"/>
+          <c:y val="0.36946882994706787"/>
+          <c:w val="0.44443471918307798"/>
+          <c:h val="0.23989801274840644"/>
+        </c:manualLayout>
+      </c:layout>
+      <c:txPr>
+        <a:bodyPr/>
+        <a:lstStyle/>
+        <a:p>
+          <a:pPr>
+            <a:defRPr sz="1400"/>
+          </a:pPr>
+          <a:endParaRPr lang="en-US"/>
+        </a:p>
+      </c:txPr>
+    </c:legend>
     <c:plotVisOnly val="1"/>
   </c:chart>
   <c:spPr>
@@ -1399,7 +2609,8 @@
           <a:p>
             <a:fld id="{ED645053-3814-4470-8BD9-EBE66279CAA8}" type="datetimeFigureOut">
               <a:rPr lang="en-US" smtClean="0"/>
-              <a:t>4/15/2011</a:t>
+              <a:pPr/>
+              <a:t>4/18/2011</a:t>
             </a:fld>
             <a:endParaRPr lang="en-US"/>
           </a:p>
@@ -1441,6 +2652,7 @@
           <a:p>
             <a:fld id="{34CB092F-9100-4657-87D2-3909E51B7EA1}" type="slidenum">
               <a:rPr lang="en-US" smtClean="0"/>
+              <a:pPr/>
               <a:t>‹#›</a:t>
             </a:fld>
             <a:endParaRPr lang="en-US"/>
@@ -1564,7 +2776,8 @@
           <a:p>
             <a:fld id="{ED645053-3814-4470-8BD9-EBE66279CAA8}" type="datetimeFigureOut">
               <a:rPr lang="en-US" smtClean="0"/>
-              <a:t>4/15/2011</a:t>
+              <a:pPr/>
+              <a:t>4/18/2011</a:t>
             </a:fld>
             <a:endParaRPr lang="en-US"/>
           </a:p>
@@ -1606,6 +2819,7 @@
           <a:p>
             <a:fld id="{34CB092F-9100-4657-87D2-3909E51B7EA1}" type="slidenum">
               <a:rPr lang="en-US" smtClean="0"/>
+              <a:pPr/>
               <a:t>‹#›</a:t>
             </a:fld>
             <a:endParaRPr lang="en-US"/>
@@ -1739,7 +2953,8 @@
           <a:p>
             <a:fld id="{ED645053-3814-4470-8BD9-EBE66279CAA8}" type="datetimeFigureOut">
               <a:rPr lang="en-US" smtClean="0"/>
-              <a:t>4/15/2011</a:t>
+              <a:pPr/>
+              <a:t>4/18/2011</a:t>
             </a:fld>
             <a:endParaRPr lang="en-US"/>
           </a:p>
@@ -1781,6 +2996,7 @@
           <a:p>
             <a:fld id="{34CB092F-9100-4657-87D2-3909E51B7EA1}" type="slidenum">
               <a:rPr lang="en-US" smtClean="0"/>
+              <a:pPr/>
               <a:t>‹#›</a:t>
             </a:fld>
             <a:endParaRPr lang="en-US"/>
@@ -1904,7 +3120,8 @@
           <a:p>
             <a:fld id="{ED645053-3814-4470-8BD9-EBE66279CAA8}" type="datetimeFigureOut">
               <a:rPr lang="en-US" smtClean="0"/>
-              <a:t>4/15/2011</a:t>
+              <a:pPr/>
+              <a:t>4/18/2011</a:t>
             </a:fld>
             <a:endParaRPr lang="en-US"/>
           </a:p>
@@ -1946,6 +3163,7 @@
           <a:p>
             <a:fld id="{34CB092F-9100-4657-87D2-3909E51B7EA1}" type="slidenum">
               <a:rPr lang="en-US" smtClean="0"/>
+              <a:pPr/>
               <a:t>‹#›</a:t>
             </a:fld>
             <a:endParaRPr lang="en-US"/>
@@ -2145,7 +3363,8 @@
           <a:p>
             <a:fld id="{ED645053-3814-4470-8BD9-EBE66279CAA8}" type="datetimeFigureOut">
               <a:rPr lang="en-US" smtClean="0"/>
-              <a:t>4/15/2011</a:t>
+              <a:pPr/>
+              <a:t>4/18/2011</a:t>
             </a:fld>
             <a:endParaRPr lang="en-US"/>
           </a:p>
@@ -2187,6 +3406,7 @@
           <a:p>
             <a:fld id="{34CB092F-9100-4657-87D2-3909E51B7EA1}" type="slidenum">
               <a:rPr lang="en-US" smtClean="0"/>
+              <a:pPr/>
               <a:t>‹#›</a:t>
             </a:fld>
             <a:endParaRPr lang="en-US"/>
@@ -2428,7 +3648,8 @@
           <a:p>
             <a:fld id="{ED645053-3814-4470-8BD9-EBE66279CAA8}" type="datetimeFigureOut">
               <a:rPr lang="en-US" smtClean="0"/>
-              <a:t>4/15/2011</a:t>
+              <a:pPr/>
+              <a:t>4/18/2011</a:t>
             </a:fld>
             <a:endParaRPr lang="en-US"/>
           </a:p>
@@ -2470,6 +3691,7 @@
           <a:p>
             <a:fld id="{34CB092F-9100-4657-87D2-3909E51B7EA1}" type="slidenum">
               <a:rPr lang="en-US" smtClean="0"/>
+              <a:pPr/>
               <a:t>‹#›</a:t>
             </a:fld>
             <a:endParaRPr lang="en-US"/>
@@ -2845,7 +4067,8 @@
           <a:p>
             <a:fld id="{ED645053-3814-4470-8BD9-EBE66279CAA8}" type="datetimeFigureOut">
               <a:rPr lang="en-US" smtClean="0"/>
-              <a:t>4/15/2011</a:t>
+              <a:pPr/>
+              <a:t>4/18/2011</a:t>
             </a:fld>
             <a:endParaRPr lang="en-US"/>
           </a:p>
@@ -2887,6 +4110,7 @@
           <a:p>
             <a:fld id="{34CB092F-9100-4657-87D2-3909E51B7EA1}" type="slidenum">
               <a:rPr lang="en-US" smtClean="0"/>
+              <a:pPr/>
               <a:t>‹#›</a:t>
             </a:fld>
             <a:endParaRPr lang="en-US"/>
@@ -2958,7 +4182,8 @@
           <a:p>
             <a:fld id="{ED645053-3814-4470-8BD9-EBE66279CAA8}" type="datetimeFigureOut">
               <a:rPr lang="en-US" smtClean="0"/>
-              <a:t>4/15/2011</a:t>
+              <a:pPr/>
+              <a:t>4/18/2011</a:t>
             </a:fld>
             <a:endParaRPr lang="en-US"/>
           </a:p>
@@ -3000,6 +4225,7 @@
           <a:p>
             <a:fld id="{34CB092F-9100-4657-87D2-3909E51B7EA1}" type="slidenum">
               <a:rPr lang="en-US" smtClean="0"/>
+              <a:pPr/>
               <a:t>‹#›</a:t>
             </a:fld>
             <a:endParaRPr lang="en-US"/>
@@ -3048,7 +4274,8 @@
           <a:p>
             <a:fld id="{ED645053-3814-4470-8BD9-EBE66279CAA8}" type="datetimeFigureOut">
               <a:rPr lang="en-US" smtClean="0"/>
-              <a:t>4/15/2011</a:t>
+              <a:pPr/>
+              <a:t>4/18/2011</a:t>
             </a:fld>
             <a:endParaRPr lang="en-US"/>
           </a:p>
@@ -3090,6 +4317,7 @@
           <a:p>
             <a:fld id="{34CB092F-9100-4657-87D2-3909E51B7EA1}" type="slidenum">
               <a:rPr lang="en-US" smtClean="0"/>
+              <a:pPr/>
               <a:t>‹#›</a:t>
             </a:fld>
             <a:endParaRPr lang="en-US"/>
@@ -3320,7 +4548,8 @@
           <a:p>
             <a:fld id="{ED645053-3814-4470-8BD9-EBE66279CAA8}" type="datetimeFigureOut">
               <a:rPr lang="en-US" smtClean="0"/>
-              <a:t>4/15/2011</a:t>
+              <a:pPr/>
+              <a:t>4/18/2011</a:t>
             </a:fld>
             <a:endParaRPr lang="en-US"/>
           </a:p>
@@ -3362,6 +4591,7 @@
           <a:p>
             <a:fld id="{34CB092F-9100-4657-87D2-3909E51B7EA1}" type="slidenum">
               <a:rPr lang="en-US" smtClean="0"/>
+              <a:pPr/>
               <a:t>‹#›</a:t>
             </a:fld>
             <a:endParaRPr lang="en-US"/>
@@ -3568,7 +4798,8 @@
           <a:p>
             <a:fld id="{ED645053-3814-4470-8BD9-EBE66279CAA8}" type="datetimeFigureOut">
               <a:rPr lang="en-US" smtClean="0"/>
-              <a:t>4/15/2011</a:t>
+              <a:pPr/>
+              <a:t>4/18/2011</a:t>
             </a:fld>
             <a:endParaRPr lang="en-US"/>
           </a:p>
@@ -3610,6 +4841,7 @@
           <a:p>
             <a:fld id="{34CB092F-9100-4657-87D2-3909E51B7EA1}" type="slidenum">
               <a:rPr lang="en-US" smtClean="0"/>
+              <a:pPr/>
               <a:t>‹#›</a:t>
             </a:fld>
             <a:endParaRPr lang="en-US"/>
@@ -3776,7 +5008,8 @@
           <a:p>
             <a:fld id="{ED645053-3814-4470-8BD9-EBE66279CAA8}" type="datetimeFigureOut">
               <a:rPr lang="en-US" smtClean="0"/>
-              <a:t>4/15/2011</a:t>
+              <a:pPr/>
+              <a:t>4/18/2011</a:t>
             </a:fld>
             <a:endParaRPr lang="en-US"/>
           </a:p>
@@ -3854,6 +5087,7 @@
           <a:p>
             <a:fld id="{34CB092F-9100-4657-87D2-3909E51B7EA1}" type="slidenum">
               <a:rPr lang="en-US" smtClean="0"/>
+              <a:pPr/>
               <a:t>‹#›</a:t>
             </a:fld>
             <a:endParaRPr lang="en-US"/>
@@ -4153,8 +5387,8 @@
           <p:nvPr/>
         </p:nvGraphicFramePr>
         <p:xfrm>
-          <a:off x="0" y="0"/>
-          <a:ext cx="4076700" cy="2619375"/>
+          <a:off x="3505200" y="0"/>
+          <a:ext cx="4038600" cy="2667000"/>
         </p:xfrm>
         <a:graphic>
           <a:graphicData uri="http://schemas.openxmlformats.org/drawingml/2006/chart">
@@ -4170,7 +5404,7 @@
         </p:nvSpPr>
         <p:spPr>
           <a:xfrm>
-            <a:off x="2667000" y="152400"/>
+            <a:off x="5715000" y="152400"/>
             <a:ext cx="1143000" cy="307777"/>
           </a:xfrm>
           <a:prstGeom prst="rect">
@@ -4189,6 +5423,82 @@
               <a:t>TMR = 1.2</a:t>
             </a:r>
             <a:endParaRPr lang="en-US" sz="1400" dirty="0"/>
+          </a:p>
+        </p:txBody>
+      </p:sp>
+      <p:graphicFrame>
+        <p:nvGraphicFramePr>
+          <p:cNvPr id="6" name="Chart 5"/>
+          <p:cNvGraphicFramePr/>
+          <p:nvPr/>
+        </p:nvGraphicFramePr>
+        <p:xfrm>
+          <a:off x="1" y="1"/>
+          <a:ext cx="3886199" cy="2666999"/>
+        </p:xfrm>
+        <a:graphic>
+          <a:graphicData uri="http://schemas.openxmlformats.org/drawingml/2006/chart">
+            <c:chart xmlns:c="http://schemas.openxmlformats.org/drawingml/2006/chart" xmlns:r="http://schemas.openxmlformats.org/officeDocument/2006/relationships" r:id="rId3"/>
+          </a:graphicData>
+        </a:graphic>
+      </p:graphicFrame>
+      <p:sp>
+        <p:nvSpPr>
+          <p:cNvPr id="7" name="TextBox 6"/>
+          <p:cNvSpPr txBox="1"/>
+          <p:nvPr/>
+        </p:nvSpPr>
+        <p:spPr>
+          <a:xfrm>
+            <a:off x="1981200" y="2590800"/>
+            <a:ext cx="990600" cy="307777"/>
+          </a:xfrm>
+          <a:prstGeom prst="rect">
+            <a:avLst/>
+          </a:prstGeom>
+          <a:noFill/>
+        </p:spPr>
+        <p:txBody>
+          <a:bodyPr wrap="square" rtlCol="0">
+            <a:spAutoFit/>
+          </a:bodyPr>
+          <a:lstStyle/>
+          <a:p>
+            <a:r>
+              <a:rPr lang="en-US" sz="1400" b="1" dirty="0" smtClean="0"/>
+              <a:t>(a)</a:t>
+            </a:r>
+            <a:endParaRPr lang="en-US" sz="1400" b="1" dirty="0"/>
+          </a:p>
+        </p:txBody>
+      </p:sp>
+      <p:sp>
+        <p:nvSpPr>
+          <p:cNvPr id="8" name="TextBox 7"/>
+          <p:cNvSpPr txBox="1"/>
+          <p:nvPr/>
+        </p:nvSpPr>
+        <p:spPr>
+          <a:xfrm>
+            <a:off x="5486400" y="2590800"/>
+            <a:ext cx="990600" cy="307777"/>
+          </a:xfrm>
+          <a:prstGeom prst="rect">
+            <a:avLst/>
+          </a:prstGeom>
+          <a:noFill/>
+        </p:spPr>
+        <p:txBody>
+          <a:bodyPr wrap="square" rtlCol="0">
+            <a:spAutoFit/>
+          </a:bodyPr>
+          <a:lstStyle/>
+          <a:p>
+            <a:r>
+              <a:rPr lang="en-US" sz="1400" b="1" dirty="0" smtClean="0"/>
+              <a:t>(b)</a:t>
+            </a:r>
+            <a:endParaRPr lang="en-US" sz="1400" b="1" dirty="0"/>
           </a:p>
         </p:txBody>
       </p:sp>

</xml_diff>